<commit_message>
Added shapes to poster
</commit_message>
<xml_diff>
--- a/A1 Poster COMP1004 MB.pptx
+++ b/A1 Poster COMP1004 MB.pptx
@@ -153,18 +153,18 @@
   <pc:docChgLst>
     <pc:chgData name="Martin Bath" userId="10ed2a8438d10cb3" providerId="LiveId" clId="{83C842FE-6995-4882-B72E-D3713F9D48BE}"/>
     <pc:docChg chg="modSld modNotesMaster">
-      <pc:chgData name="Martin Bath" userId="10ed2a8438d10cb3" providerId="LiveId" clId="{83C842FE-6995-4882-B72E-D3713F9D48BE}" dt="2025-03-18T18:24:38.959" v="229" actId="14100"/>
+      <pc:chgData name="Martin Bath" userId="10ed2a8438d10cb3" providerId="LiveId" clId="{83C842FE-6995-4882-B72E-D3713F9D48BE}" dt="2025-03-21T15:36:13.543" v="350" actId="1035"/>
       <pc:docMkLst>
         <pc:docMk/>
       </pc:docMkLst>
       <pc:sldChg chg="addSp modSp mod setBg modNotes">
-        <pc:chgData name="Martin Bath" userId="10ed2a8438d10cb3" providerId="LiveId" clId="{83C842FE-6995-4882-B72E-D3713F9D48BE}" dt="2025-03-18T18:24:38.959" v="229" actId="14100"/>
+        <pc:chgData name="Martin Bath" userId="10ed2a8438d10cb3" providerId="LiveId" clId="{83C842FE-6995-4882-B72E-D3713F9D48BE}" dt="2025-03-21T15:36:13.543" v="350" actId="1035"/>
         <pc:sldMkLst>
           <pc:docMk/>
           <pc:sldMk cId="530449856" sldId="256"/>
         </pc:sldMkLst>
         <pc:spChg chg="add mod">
-          <ac:chgData name="Martin Bath" userId="10ed2a8438d10cb3" providerId="LiveId" clId="{83C842FE-6995-4882-B72E-D3713F9D48BE}" dt="2025-03-17T22:17:20.522" v="28" actId="255"/>
+          <ac:chgData name="Martin Bath" userId="10ed2a8438d10cb3" providerId="LiveId" clId="{83C842FE-6995-4882-B72E-D3713F9D48BE}" dt="2025-03-21T15:36:13.543" v="350" actId="1035"/>
           <ac:spMkLst>
             <pc:docMk/>
             <pc:sldMk cId="530449856" sldId="256"/>
@@ -172,7 +172,7 @@
           </ac:spMkLst>
         </pc:spChg>
         <pc:spChg chg="add mod">
-          <ac:chgData name="Martin Bath" userId="10ed2a8438d10cb3" providerId="LiveId" clId="{83C842FE-6995-4882-B72E-D3713F9D48BE}" dt="2025-03-18T18:23:17.479" v="89" actId="1037"/>
+          <ac:chgData name="Martin Bath" userId="10ed2a8438d10cb3" providerId="LiveId" clId="{83C842FE-6995-4882-B72E-D3713F9D48BE}" dt="2025-03-21T15:36:07.874" v="332" actId="1036"/>
           <ac:spMkLst>
             <pc:docMk/>
             <pc:sldMk cId="530449856" sldId="256"/>
@@ -196,7 +196,7 @@
           </ac:spMkLst>
         </pc:spChg>
         <pc:picChg chg="mod">
-          <ac:chgData name="Martin Bath" userId="10ed2a8438d10cb3" providerId="LiveId" clId="{83C842FE-6995-4882-B72E-D3713F9D48BE}" dt="2025-03-18T18:24:38.959" v="229" actId="14100"/>
+          <ac:chgData name="Martin Bath" userId="10ed2a8438d10cb3" providerId="LiveId" clId="{83C842FE-6995-4882-B72E-D3713F9D48BE}" dt="2025-03-21T12:05:50.834" v="267" actId="1037"/>
           <ac:picMkLst>
             <pc:docMk/>
             <pc:sldMk cId="530449856" sldId="256"/>
@@ -204,7 +204,7 @@
           </ac:picMkLst>
         </pc:picChg>
         <pc:picChg chg="mod">
-          <ac:chgData name="Martin Bath" userId="10ed2a8438d10cb3" providerId="LiveId" clId="{83C842FE-6995-4882-B72E-D3713F9D48BE}" dt="2025-03-18T18:24:18.751" v="197" actId="1038"/>
+          <ac:chgData name="Martin Bath" userId="10ed2a8438d10cb3" providerId="LiveId" clId="{83C842FE-6995-4882-B72E-D3713F9D48BE}" dt="2025-03-21T15:35:56.810" v="322" actId="1037"/>
           <ac:picMkLst>
             <pc:docMk/>
             <pc:sldMk cId="530449856" sldId="256"/>
@@ -212,7 +212,7 @@
           </ac:picMkLst>
         </pc:picChg>
         <pc:picChg chg="mod">
-          <ac:chgData name="Martin Bath" userId="10ed2a8438d10cb3" providerId="LiveId" clId="{83C842FE-6995-4882-B72E-D3713F9D48BE}" dt="2025-03-18T18:19:09.229" v="49" actId="14826"/>
+          <ac:chgData name="Martin Bath" userId="10ed2a8438d10cb3" providerId="LiveId" clId="{83C842FE-6995-4882-B72E-D3713F9D48BE}" dt="2025-03-21T12:05:54.868" v="285" actId="1036"/>
           <ac:picMkLst>
             <pc:docMk/>
             <pc:sldMk cId="530449856" sldId="256"/>
@@ -307,7 +307,7 @@
           <a:p>
             <a:fld id="{40B2206F-7194-4E11-805A-5295AF5385CE}" type="datetimeFigureOut">
               <a:rPr lang="en-GB" smtClean="0"/>
-              <a:t>18/03/2025</a:t>
+              <a:t>21/03/2025</a:t>
             </a:fld>
             <a:endParaRPr lang="en-GB" dirty="0"/>
           </a:p>
@@ -795,7 +795,7 @@
           <a:p>
             <a:fld id="{1381CABE-BD8A-4ED8-BE60-32148880DEC7}" type="datetimeFigureOut">
               <a:rPr lang="en-GB" smtClean="0"/>
-              <a:t>18/03/2025</a:t>
+              <a:t>21/03/2025</a:t>
             </a:fld>
             <a:endParaRPr lang="en-GB" dirty="0"/>
           </a:p>
@@ -965,7 +965,7 @@
           <a:p>
             <a:fld id="{1381CABE-BD8A-4ED8-BE60-32148880DEC7}" type="datetimeFigureOut">
               <a:rPr lang="en-GB" smtClean="0"/>
-              <a:t>18/03/2025</a:t>
+              <a:t>21/03/2025</a:t>
             </a:fld>
             <a:endParaRPr lang="en-GB" dirty="0"/>
           </a:p>
@@ -1145,7 +1145,7 @@
           <a:p>
             <a:fld id="{1381CABE-BD8A-4ED8-BE60-32148880DEC7}" type="datetimeFigureOut">
               <a:rPr lang="en-GB" smtClean="0"/>
-              <a:t>18/03/2025</a:t>
+              <a:t>21/03/2025</a:t>
             </a:fld>
             <a:endParaRPr lang="en-GB" dirty="0"/>
           </a:p>
@@ -1315,7 +1315,7 @@
           <a:p>
             <a:fld id="{1381CABE-BD8A-4ED8-BE60-32148880DEC7}" type="datetimeFigureOut">
               <a:rPr lang="en-GB" smtClean="0"/>
-              <a:t>18/03/2025</a:t>
+              <a:t>21/03/2025</a:t>
             </a:fld>
             <a:endParaRPr lang="en-GB" dirty="0"/>
           </a:p>
@@ -1559,7 +1559,7 @@
           <a:p>
             <a:fld id="{1381CABE-BD8A-4ED8-BE60-32148880DEC7}" type="datetimeFigureOut">
               <a:rPr lang="en-GB" smtClean="0"/>
-              <a:t>18/03/2025</a:t>
+              <a:t>21/03/2025</a:t>
             </a:fld>
             <a:endParaRPr lang="en-GB" dirty="0"/>
           </a:p>
@@ -1791,7 +1791,7 @@
           <a:p>
             <a:fld id="{1381CABE-BD8A-4ED8-BE60-32148880DEC7}" type="datetimeFigureOut">
               <a:rPr lang="en-GB" smtClean="0"/>
-              <a:t>18/03/2025</a:t>
+              <a:t>21/03/2025</a:t>
             </a:fld>
             <a:endParaRPr lang="en-GB" dirty="0"/>
           </a:p>
@@ -2158,7 +2158,7 @@
           <a:p>
             <a:fld id="{1381CABE-BD8A-4ED8-BE60-32148880DEC7}" type="datetimeFigureOut">
               <a:rPr lang="en-GB" smtClean="0"/>
-              <a:t>18/03/2025</a:t>
+              <a:t>21/03/2025</a:t>
             </a:fld>
             <a:endParaRPr lang="en-GB" dirty="0"/>
           </a:p>
@@ -2276,7 +2276,7 @@
           <a:p>
             <a:fld id="{1381CABE-BD8A-4ED8-BE60-32148880DEC7}" type="datetimeFigureOut">
               <a:rPr lang="en-GB" smtClean="0"/>
-              <a:t>18/03/2025</a:t>
+              <a:t>21/03/2025</a:t>
             </a:fld>
             <a:endParaRPr lang="en-GB" dirty="0"/>
           </a:p>
@@ -2371,7 +2371,7 @@
           <a:p>
             <a:fld id="{1381CABE-BD8A-4ED8-BE60-32148880DEC7}" type="datetimeFigureOut">
               <a:rPr lang="en-GB" smtClean="0"/>
-              <a:t>18/03/2025</a:t>
+              <a:t>21/03/2025</a:t>
             </a:fld>
             <a:endParaRPr lang="en-GB" dirty="0"/>
           </a:p>
@@ -2648,7 +2648,7 @@
           <a:p>
             <a:fld id="{1381CABE-BD8A-4ED8-BE60-32148880DEC7}" type="datetimeFigureOut">
               <a:rPr lang="en-GB" smtClean="0"/>
-              <a:t>18/03/2025</a:t>
+              <a:t>21/03/2025</a:t>
             </a:fld>
             <a:endParaRPr lang="en-GB" dirty="0"/>
           </a:p>
@@ -2905,7 +2905,7 @@
           <a:p>
             <a:fld id="{1381CABE-BD8A-4ED8-BE60-32148880DEC7}" type="datetimeFigureOut">
               <a:rPr lang="en-GB" smtClean="0"/>
-              <a:t>18/03/2025</a:t>
+              <a:t>21/03/2025</a:t>
             </a:fld>
             <a:endParaRPr lang="en-GB" dirty="0"/>
           </a:p>
@@ -3118,7 +3118,7 @@
           <a:p>
             <a:fld id="{1381CABE-BD8A-4ED8-BE60-32148880DEC7}" type="datetimeFigureOut">
               <a:rPr lang="en-GB" smtClean="0"/>
-              <a:t>18/03/2025</a:t>
+              <a:t>21/03/2025</a:t>
             </a:fld>
             <a:endParaRPr lang="en-GB" dirty="0"/>
           </a:p>
@@ -3846,7 +3846,7 @@
         </p:nvSpPr>
         <p:spPr>
           <a:xfrm>
-            <a:off x="7535528" y="1089454"/>
+            <a:off x="7535528" y="656320"/>
             <a:ext cx="13451307" cy="1323439"/>
           </a:xfrm>
           <a:prstGeom prst="rect">
@@ -3914,8 +3914,8 @@
         </p:nvSpPr>
         <p:spPr>
           <a:xfrm>
-            <a:off x="3948705" y="3874773"/>
-            <a:ext cx="7291136" cy="6872715"/>
+            <a:off x="2646948" y="3017984"/>
+            <a:ext cx="8496641" cy="7879529"/>
           </a:xfrm>
           <a:prstGeom prst="rect">
             <a:avLst/>
@@ -4009,7 +4009,7 @@
               </a:spcAft>
             </a:pPr>
             <a:r>
-              <a:rPr lang="en-GB" sz="2400" kern="100" dirty="0">
+              <a:rPr lang="en-GB" sz="2800" kern="100" dirty="0">
                 <a:effectLst/>
                 <a:latin typeface="Aptos" panose="020B0004020202020204" pitchFamily="34" charset="0"/>
                 <a:ea typeface="Aptos" panose="020B0004020202020204" pitchFamily="34" charset="0"/>
@@ -4018,7 +4018,7 @@
               <a:t>Suggested by staff and pupils Eat That Frog (eatthatfrog.ac.uk), a specialist post-16 institution, the app was to incorporate 9 mini games of Noughts &amp; Crosses within a larger game of Noughts &amp; Crosses to achieve a game which worked on many levels, where pupils could play on their own or against a tutor during 1-2-1 sessions. The colour scheme was to be dyslexia friendly as per the “Dyslexia friendly style guide”  the  British Dyslexia Association (</a:t>
             </a:r>
             <a:r>
-              <a:rPr lang="en-GB" sz="2400" kern="100" dirty="0">
+              <a:rPr lang="en-GB" sz="2800" kern="100" dirty="0">
                 <a:solidFill>
                   <a:srgbClr val="467886"/>
                 </a:solidFill>
@@ -4030,7 +4030,7 @@
               <a:t>www.bdadyslexia.org.uk</a:t>
             </a:r>
             <a:r>
-              <a:rPr lang="en-GB" sz="2400" kern="100" dirty="0">
+              <a:rPr lang="en-GB" sz="2800" kern="100" dirty="0">
                 <a:effectLst/>
                 <a:latin typeface="Aptos" panose="020B0004020202020204" pitchFamily="34" charset="0"/>
                 <a:ea typeface="Aptos" panose="020B0004020202020204" pitchFamily="34" charset="0"/>
@@ -4563,7 +4563,7 @@
         </p:blipFill>
         <p:spPr>
           <a:xfrm>
-            <a:off x="3342417" y="11288211"/>
+            <a:off x="3101787" y="11697282"/>
             <a:ext cx="5700986" cy="5026609"/>
           </a:xfrm>
           <a:prstGeom prst="rect">
@@ -4660,7 +4660,7 @@
         </p:blipFill>
         <p:spPr>
           <a:xfrm>
-            <a:off x="13178387" y="3242304"/>
+            <a:off x="13178387" y="3675438"/>
             <a:ext cx="3364989" cy="3391519"/>
           </a:xfrm>
           <a:prstGeom prst="rect">
@@ -4720,8 +4720,8 @@
         </p:blipFill>
         <p:spPr>
           <a:xfrm>
-            <a:off x="20845723" y="11526254"/>
-            <a:ext cx="5317640" cy="5058243"/>
+            <a:off x="21223709" y="12045440"/>
+            <a:ext cx="4265889" cy="4057796"/>
           </a:xfrm>
           <a:prstGeom prst="rect">
             <a:avLst/>
@@ -5367,15 +5367,6 @@
 </file>
 
 <file path=customXml/item2.xml><?xml version="1.0" encoding="utf-8"?>
-<?mso-contentType ?>
-<FormTemplates xmlns="http://schemas.microsoft.com/sharepoint/v3/contenttype/forms">
-  <Display>DocumentLibraryForm</Display>
-  <Edit>DocumentLibraryForm</Edit>
-  <New>DocumentLibraryForm</New>
-</FormTemplates>
-</file>
-
-<file path=customXml/item3.xml><?xml version="1.0" encoding="utf-8"?>
 <ct:contentTypeSchema xmlns:ct="http://schemas.microsoft.com/office/2006/metadata/contentType" xmlns:ma="http://schemas.microsoft.com/office/2006/metadata/properties/metaAttributes" ct:_="" ma:_="" ma:contentTypeName="Document" ma:contentTypeID="0x010100183530F9ADBD1D48AC3974C37B1F16E8" ma:contentTypeVersion="24" ma:contentTypeDescription="Create a new document." ma:contentTypeScope="" ma:versionID="70394ba201040ca3d815e3c4f7012274">
   <xsd:schema xmlns:xsd="http://www.w3.org/2001/XMLSchema" xmlns:xs="http://www.w3.org/2001/XMLSchema" xmlns:p="http://schemas.microsoft.com/office/2006/metadata/properties" xmlns:ns3="72339acb-e8cc-4142-9dab-9dca3e7dada8" xmlns:ns4="dc781de3-bafc-4db7-a392-5d8a9e9bc0f5" targetNamespace="http://schemas.microsoft.com/office/2006/metadata/properties" ma:root="true" ma:fieldsID="d0d4fd1207dbf170f06c018f7c6b1e9a" ns3:_="" ns4:_="">
     <xsd:import namespace="72339acb-e8cc-4142-9dab-9dca3e7dada8"/>
@@ -5726,6 +5717,15 @@
 </ct:contentTypeSchema>
 </file>
 
+<file path=customXml/item3.xml><?xml version="1.0" encoding="utf-8"?>
+<?mso-contentType ?>
+<FormTemplates xmlns="http://schemas.microsoft.com/sharepoint/v3/contenttype/forms">
+  <Display>DocumentLibraryForm</Display>
+  <Edit>DocumentLibraryForm</Edit>
+  <New>DocumentLibraryForm</New>
+</FormTemplates>
+</file>
+
 <file path=customXml/itemProps1.xml><?xml version="1.0" encoding="utf-8"?>
 <ds:datastoreItem xmlns:ds="http://schemas.openxmlformats.org/officeDocument/2006/customXml" ds:itemID="{48338919-CAB7-4AC9-BE2B-610C7C37C733}">
   <ds:schemaRefs>
@@ -5744,14 +5744,6 @@
 </file>
 
 <file path=customXml/itemProps2.xml><?xml version="1.0" encoding="utf-8"?>
-<ds:datastoreItem xmlns:ds="http://schemas.openxmlformats.org/officeDocument/2006/customXml" ds:itemID="{90E91343-FC66-4181-B87C-967309332136}">
-  <ds:schemaRefs>
-    <ds:schemaRef ds:uri="http://schemas.microsoft.com/sharepoint/v3/contenttype/forms"/>
-  </ds:schemaRefs>
-</ds:datastoreItem>
-</file>
-
-<file path=customXml/itemProps3.xml><?xml version="1.0" encoding="utf-8"?>
 <ds:datastoreItem xmlns:ds="http://schemas.openxmlformats.org/officeDocument/2006/customXml" ds:itemID="{6D556809-3C50-4FFA-808E-E6B975D92521}">
   <ds:schemaRefs>
     <ds:schemaRef ds:uri="http://schemas.microsoft.com/office/2006/metadata/contentType"/>
@@ -5768,4 +5760,12 @@
     <ds:schemaRef ds:uri="http://schemas.microsoft.com/internal/obd"/>
   </ds:schemaRefs>
 </ds:datastoreItem>
+</file>
+
+<file path=customXml/itemProps3.xml><?xml version="1.0" encoding="utf-8"?>
+<ds:datastoreItem xmlns:ds="http://schemas.openxmlformats.org/officeDocument/2006/customXml" ds:itemID="{90E91343-FC66-4181-B87C-967309332136}">
+  <ds:schemaRefs>
+    <ds:schemaRef ds:uri="http://schemas.microsoft.com/sharepoint/v3/contenttype/forms"/>
+  </ds:schemaRefs>
+</ds:datastoreItem>
 </file>
</xml_diff>